<commit_message>
commented badger and finished final report
</commit_message>
<xml_diff>
--- a/writeup/badgers.pptx
+++ b/writeup/badgers.pptx
@@ -220,7 +220,7 @@
           <a:p>
             <a:fld id="{551D2AB0-C9F6-4F0E-85A5-8097B634F309}" type="datetimeFigureOut">
               <a:rPr lang="en-US" smtClean="0"/>
-              <a:t>12/12/2016</a:t>
+              <a:t>12/15/2016</a:t>
             </a:fld>
             <a:endParaRPr lang="en-US"/>
           </a:p>
@@ -315,7 +315,6 @@
               <a:rPr lang="en-US"/>
               <a:t>Fifth level</a:t>
             </a:r>
-            <a:endParaRPr lang="en-US"/>
           </a:p>
         </p:txBody>
       </p:sp>
@@ -822,7 +821,7 @@
           <a:p>
             <a:fld id="{7D249AB7-AC54-4C81-AE16-BE8C04546957}" type="datetimeFigureOut">
               <a:rPr lang="en-US" smtClean="0"/>
-              <a:t>12/11/2016</a:t>
+              <a:t>12/15/2016</a:t>
             </a:fld>
             <a:endParaRPr lang="en-US"/>
           </a:p>
@@ -1030,7 +1029,7 @@
           <a:p>
             <a:fld id="{7D249AB7-AC54-4C81-AE16-BE8C04546957}" type="datetimeFigureOut">
               <a:rPr lang="en-US" smtClean="0"/>
-              <a:t>12/11/2016</a:t>
+              <a:t>12/15/2016</a:t>
             </a:fld>
             <a:endParaRPr lang="en-US"/>
           </a:p>
@@ -1286,7 +1285,7 @@
           <a:p>
             <a:fld id="{7D249AB7-AC54-4C81-AE16-BE8C04546957}" type="datetimeFigureOut">
               <a:rPr lang="en-US" smtClean="0"/>
-              <a:t>12/11/2016</a:t>
+              <a:t>12/15/2016</a:t>
             </a:fld>
             <a:endParaRPr lang="en-US"/>
           </a:p>
@@ -1456,7 +1455,7 @@
           <a:p>
             <a:fld id="{7D249AB7-AC54-4C81-AE16-BE8C04546957}" type="datetimeFigureOut">
               <a:rPr lang="en-US" smtClean="0"/>
-              <a:t>12/11/2016</a:t>
+              <a:t>12/15/2016</a:t>
             </a:fld>
             <a:endParaRPr lang="en-US"/>
           </a:p>
@@ -1799,7 +1798,7 @@
           <a:p>
             <a:fld id="{7D249AB7-AC54-4C81-AE16-BE8C04546957}" type="datetimeFigureOut">
               <a:rPr lang="en-US" smtClean="0"/>
-              <a:t>12/11/2016</a:t>
+              <a:t>12/15/2016</a:t>
             </a:fld>
             <a:endParaRPr lang="en-US"/>
           </a:p>
@@ -2074,7 +2073,7 @@
           <a:p>
             <a:fld id="{7D249AB7-AC54-4C81-AE16-BE8C04546957}" type="datetimeFigureOut">
               <a:rPr lang="en-US" smtClean="0"/>
-              <a:t>12/11/2016</a:t>
+              <a:t>12/15/2016</a:t>
             </a:fld>
             <a:endParaRPr lang="en-US"/>
           </a:p>
@@ -2453,7 +2452,7 @@
           <a:p>
             <a:fld id="{7D249AB7-AC54-4C81-AE16-BE8C04546957}" type="datetimeFigureOut">
               <a:rPr lang="en-US" smtClean="0"/>
-              <a:t>12/11/2016</a:t>
+              <a:t>12/15/2016</a:t>
             </a:fld>
             <a:endParaRPr lang="en-US"/>
           </a:p>
@@ -2571,7 +2570,7 @@
           <a:p>
             <a:fld id="{7D249AB7-AC54-4C81-AE16-BE8C04546957}" type="datetimeFigureOut">
               <a:rPr lang="en-US" smtClean="0"/>
-              <a:t>12/11/2016</a:t>
+              <a:t>12/15/2016</a:t>
             </a:fld>
             <a:endParaRPr lang="en-US"/>
           </a:p>
@@ -2742,7 +2741,7 @@
           <a:p>
             <a:fld id="{7D249AB7-AC54-4C81-AE16-BE8C04546957}" type="datetimeFigureOut">
               <a:rPr lang="en-US" smtClean="0"/>
-              <a:t>12/11/2016</a:t>
+              <a:t>12/15/2016</a:t>
             </a:fld>
             <a:endParaRPr lang="en-US"/>
           </a:p>
@@ -3096,7 +3095,7 @@
           <a:p>
             <a:fld id="{7D249AB7-AC54-4C81-AE16-BE8C04546957}" type="datetimeFigureOut">
               <a:rPr lang="en-US" smtClean="0"/>
-              <a:t>12/11/2016</a:t>
+              <a:t>12/15/2016</a:t>
             </a:fld>
             <a:endParaRPr lang="en-US"/>
           </a:p>
@@ -3473,7 +3472,7 @@
           <a:p>
             <a:fld id="{7D249AB7-AC54-4C81-AE16-BE8C04546957}" type="datetimeFigureOut">
               <a:rPr lang="en-US" smtClean="0"/>
-              <a:t>12/11/2016</a:t>
+              <a:t>12/15/2016</a:t>
             </a:fld>
             <a:endParaRPr lang="en-US"/>
           </a:p>
@@ -3760,7 +3759,7 @@
           <a:p>
             <a:fld id="{7D249AB7-AC54-4C81-AE16-BE8C04546957}" type="datetimeFigureOut">
               <a:rPr lang="en-US" smtClean="0"/>
-              <a:t>12/11/2016</a:t>
+              <a:t>12/15/2016</a:t>
             </a:fld>
             <a:endParaRPr lang="en-US"/>
           </a:p>
@@ -8969,7 +8968,6 @@
               <a:rPr lang="en-US" dirty="0"/>
               <a:t>Girvan-Newman Method</a:t>
             </a:r>
-            <a:endParaRPr lang="en-US" dirty="0"/>
           </a:p>
         </p:txBody>
       </p:sp>
@@ -10109,11 +10107,7 @@
           <a:p>
             <a:r>
               <a:rPr lang="en-US" dirty="0"/>
-              <a:t>Ford-Fulkerson</a:t>
-            </a:r>
-            <a:r>
-              <a:rPr lang="en-US" dirty="0"/>
-              <a:t> Method</a:t>
+              <a:t>Ford-Fulkerson Method</a:t>
             </a:r>
           </a:p>
         </p:txBody>
@@ -10679,7 +10673,7 @@
           <a:bodyPr/>
           <a:lstStyle/>
           <a:p>
-            <a:endParaRPr lang="en-US"/>
+            <a:endParaRPr lang="en-US" dirty="0"/>
           </a:p>
         </p:txBody>
       </p:sp>
@@ -10762,7 +10756,7 @@
         </p:blipFill>
         <p:spPr>
           <a:xfrm>
-            <a:off x="4645705" y="3424496"/>
+            <a:off x="3752570" y="3222478"/>
             <a:ext cx="6965724" cy="3335533"/>
           </a:xfrm>
           <a:prstGeom prst="rect">

</xml_diff>